<commit_message>
Added XPMaster functionality complete with xp and level calculators. HUD display is still missing though. Also added simple attacker side memory to the health script. Search for "//ATTACKER SIDE LOGIC" in the health script for more info.
</commit_message>
<xml_diff>
--- a/Champion Ideas/Garagast.pptx
+++ b/Champion Ideas/Garagast.pptx
@@ -247,7 +247,7 @@
           <a:p>
             <a:fld id="{57C54F97-927A-482C-AFD3-F5655244F866}" type="datetimeFigureOut">
               <a:rPr lang="en-US" smtClean="0"/>
-              <a:t>1/5/2018</a:t>
+              <a:t>4/20/2018</a:t>
             </a:fld>
             <a:endParaRPr lang="en-US"/>
           </a:p>
@@ -417,7 +417,7 @@
           <a:p>
             <a:fld id="{57C54F97-927A-482C-AFD3-F5655244F866}" type="datetimeFigureOut">
               <a:rPr lang="en-US" smtClean="0"/>
-              <a:t>1/5/2018</a:t>
+              <a:t>4/20/2018</a:t>
             </a:fld>
             <a:endParaRPr lang="en-US"/>
           </a:p>
@@ -597,7 +597,7 @@
           <a:p>
             <a:fld id="{57C54F97-927A-482C-AFD3-F5655244F866}" type="datetimeFigureOut">
               <a:rPr lang="en-US" smtClean="0"/>
-              <a:t>1/5/2018</a:t>
+              <a:t>4/20/2018</a:t>
             </a:fld>
             <a:endParaRPr lang="en-US"/>
           </a:p>
@@ -767,7 +767,7 @@
           <a:p>
             <a:fld id="{57C54F97-927A-482C-AFD3-F5655244F866}" type="datetimeFigureOut">
               <a:rPr lang="en-US" smtClean="0"/>
-              <a:t>1/5/2018</a:t>
+              <a:t>4/20/2018</a:t>
             </a:fld>
             <a:endParaRPr lang="en-US"/>
           </a:p>
@@ -1013,7 +1013,7 @@
           <a:p>
             <a:fld id="{57C54F97-927A-482C-AFD3-F5655244F866}" type="datetimeFigureOut">
               <a:rPr lang="en-US" smtClean="0"/>
-              <a:t>1/5/2018</a:t>
+              <a:t>4/20/2018</a:t>
             </a:fld>
             <a:endParaRPr lang="en-US"/>
           </a:p>
@@ -1245,7 +1245,7 @@
           <a:p>
             <a:fld id="{57C54F97-927A-482C-AFD3-F5655244F866}" type="datetimeFigureOut">
               <a:rPr lang="en-US" smtClean="0"/>
-              <a:t>1/5/2018</a:t>
+              <a:t>4/20/2018</a:t>
             </a:fld>
             <a:endParaRPr lang="en-US"/>
           </a:p>
@@ -1612,7 +1612,7 @@
           <a:p>
             <a:fld id="{57C54F97-927A-482C-AFD3-F5655244F866}" type="datetimeFigureOut">
               <a:rPr lang="en-US" smtClean="0"/>
-              <a:t>1/5/2018</a:t>
+              <a:t>4/20/2018</a:t>
             </a:fld>
             <a:endParaRPr lang="en-US"/>
           </a:p>
@@ -1730,7 +1730,7 @@
           <a:p>
             <a:fld id="{57C54F97-927A-482C-AFD3-F5655244F866}" type="datetimeFigureOut">
               <a:rPr lang="en-US" smtClean="0"/>
-              <a:t>1/5/2018</a:t>
+              <a:t>4/20/2018</a:t>
             </a:fld>
             <a:endParaRPr lang="en-US"/>
           </a:p>
@@ -1825,7 +1825,7 @@
           <a:p>
             <a:fld id="{57C54F97-927A-482C-AFD3-F5655244F866}" type="datetimeFigureOut">
               <a:rPr lang="en-US" smtClean="0"/>
-              <a:t>1/5/2018</a:t>
+              <a:t>4/20/2018</a:t>
             </a:fld>
             <a:endParaRPr lang="en-US"/>
           </a:p>
@@ -2102,7 +2102,7 @@
           <a:p>
             <a:fld id="{57C54F97-927A-482C-AFD3-F5655244F866}" type="datetimeFigureOut">
               <a:rPr lang="en-US" smtClean="0"/>
-              <a:t>1/5/2018</a:t>
+              <a:t>4/20/2018</a:t>
             </a:fld>
             <a:endParaRPr lang="en-US"/>
           </a:p>
@@ -2359,7 +2359,7 @@
           <a:p>
             <a:fld id="{57C54F97-927A-482C-AFD3-F5655244F866}" type="datetimeFigureOut">
               <a:rPr lang="en-US" smtClean="0"/>
-              <a:t>1/5/2018</a:t>
+              <a:t>4/20/2018</a:t>
             </a:fld>
             <a:endParaRPr lang="en-US"/>
           </a:p>
@@ -2572,7 +2572,7 @@
           <a:p>
             <a:fld id="{57C54F97-927A-482C-AFD3-F5655244F866}" type="datetimeFigureOut">
               <a:rPr lang="en-US" smtClean="0"/>
-              <a:t>1/5/2018</a:t>
+              <a:t>4/20/2018</a:t>
             </a:fld>
             <a:endParaRPr lang="en-US"/>
           </a:p>
@@ -3093,7 +3093,37 @@
                 <a:latin typeface="Arial" panose="020B0604020202020204" pitchFamily="34" charset="0"/>
                 <a:cs typeface="Arial" panose="020B0604020202020204" pitchFamily="34" charset="0"/>
               </a:rPr>
-              <a:t>Garagast throws an explosive barrel exploding dealing magical damage and slowing enemies in an area after 4 seconds. It can be exploded beforehand but it gains damage and slowing power as it ferments. Has 10 secs cooldown.</a:t>
+              <a:t>Throws a barrel </a:t>
+            </a:r>
+            <a:r>
+              <a:rPr lang="en-US" sz="2400" dirty="0" smtClean="0">
+                <a:solidFill>
+                  <a:schemeClr val="tx1"/>
+                </a:solidFill>
+                <a:latin typeface="Arial" panose="020B0604020202020204" pitchFamily="34" charset="0"/>
+                <a:cs typeface="Arial" panose="020B0604020202020204" pitchFamily="34" charset="0"/>
+              </a:rPr>
+              <a:t>exploding dealing magical damage and slowing enemies 30</a:t>
+            </a:r>
+            <a:r>
+              <a:rPr lang="en-US" sz="2400" dirty="0" smtClean="0">
+                <a:solidFill>
+                  <a:schemeClr val="tx1"/>
+                </a:solidFill>
+                <a:latin typeface="Arial" panose="020B0604020202020204" pitchFamily="34" charset="0"/>
+                <a:cs typeface="Arial" panose="020B0604020202020204" pitchFamily="34" charset="0"/>
+              </a:rPr>
+              <a:t>% for 2 seconds </a:t>
+            </a:r>
+            <a:r>
+              <a:rPr lang="en-US" sz="2400" dirty="0" smtClean="0">
+                <a:solidFill>
+                  <a:schemeClr val="tx1"/>
+                </a:solidFill>
+                <a:latin typeface="Arial" panose="020B0604020202020204" pitchFamily="34" charset="0"/>
+                <a:cs typeface="Arial" panose="020B0604020202020204" pitchFamily="34" charset="0"/>
+              </a:rPr>
+              <a:t>after 4 seconds. It can be exploded beforehand but it gains +25% damage per second and as it ferments, caps at 2 secs. Has 10 secs cd.</a:t>
             </a:r>
             <a:endParaRPr lang="en-US" sz="2400" dirty="0">
               <a:solidFill>
@@ -3631,7 +3661,7 @@
                 <a:latin typeface="Arial" panose="020B0604020202020204" pitchFamily="34" charset="0"/>
                 <a:cs typeface="Arial" panose="020B0604020202020204" pitchFamily="34" charset="0"/>
               </a:rPr>
-              <a:t>Passive: E knocks back 2 times.</a:t>
+              <a:t>Passive: Doubles E knock back.</a:t>
             </a:r>
           </a:p>
           <a:p>
@@ -4246,7 +4276,7 @@
                 <a:latin typeface="Arial" panose="020B0604020202020204" pitchFamily="34" charset="0"/>
                 <a:cs typeface="Arial" panose="020B0604020202020204" pitchFamily="34" charset="0"/>
               </a:rPr>
-              <a:t>Quest: Hit multiple heroes with the same Q explosion.</a:t>
+              <a:t>Quest: Hitting multiple enemy heroes with the same Q explosion gives +5% radius. (6)</a:t>
             </a:r>
             <a:endParaRPr lang="en-US" sz="2400" dirty="0">
               <a:solidFill>
@@ -4266,58 +4296,8 @@
                 <a:latin typeface="Arial" panose="020B0604020202020204" pitchFamily="34" charset="0"/>
                 <a:cs typeface="Arial" panose="020B0604020202020204" pitchFamily="34" charset="0"/>
               </a:rPr>
-              <a:t>Reward: </a:t>
-            </a:r>
-            <a:r>
-              <a:rPr lang="en-US" sz="2400" dirty="0">
-                <a:solidFill>
-                  <a:schemeClr val="tx1"/>
-                </a:solidFill>
-                <a:latin typeface="Arial" panose="020B0604020202020204" pitchFamily="34" charset="0"/>
-                <a:cs typeface="Arial" panose="020B0604020202020204" pitchFamily="34" charset="0"/>
-              </a:rPr>
-              <a:t>R</a:t>
-            </a:r>
-            <a:r>
-              <a:rPr lang="en-US" sz="2400" dirty="0" smtClean="0">
-                <a:solidFill>
-                  <a:schemeClr val="tx1"/>
-                </a:solidFill>
-                <a:latin typeface="Arial" panose="020B0604020202020204" pitchFamily="34" charset="0"/>
-                <a:cs typeface="Arial" panose="020B0604020202020204" pitchFamily="34" charset="0"/>
-              </a:rPr>
-              <a:t>ange and explosion range</a:t>
-            </a:r>
-            <a:r>
-              <a:rPr lang="en-US" sz="2400" dirty="0" smtClean="0">
-                <a:solidFill>
-                  <a:schemeClr val="tx1"/>
-                </a:solidFill>
-                <a:latin typeface="Arial" panose="020B0604020202020204" pitchFamily="34" charset="0"/>
-                <a:cs typeface="Arial" panose="020B0604020202020204" pitchFamily="34" charset="0"/>
-              </a:rPr>
-              <a:t>.</a:t>
-            </a:r>
-          </a:p>
-          <a:p>
-            <a:pPr marL="182880"/>
-            <a:r>
-              <a:rPr lang="en-US" sz="2400" dirty="0" smtClean="0">
-                <a:solidFill>
-                  <a:schemeClr val="tx1"/>
-                </a:solidFill>
-                <a:latin typeface="Arial" panose="020B0604020202020204" pitchFamily="34" charset="0"/>
-                <a:cs typeface="Arial" panose="020B0604020202020204" pitchFamily="34" charset="0"/>
-              </a:rPr>
-              <a:t>2: 3: 4: 5: +5%</a:t>
-            </a:r>
-            <a:endParaRPr lang="en-US" sz="2400" dirty="0" smtClean="0">
-              <a:solidFill>
-                <a:schemeClr val="tx1"/>
-              </a:solidFill>
-              <a:latin typeface="Arial" panose="020B0604020202020204" pitchFamily="34" charset="0"/>
-              <a:cs typeface="Arial" panose="020B0604020202020204" pitchFamily="34" charset="0"/>
-            </a:endParaRPr>
+              <a:t>Reward: +15% Q range.</a:t>
+            </a:r>
           </a:p>
         </p:txBody>
       </p:sp>
@@ -4373,7 +4353,7 @@
                 <a:latin typeface="Arial" panose="020B0604020202020204" pitchFamily="34" charset="0"/>
                 <a:cs typeface="Arial" panose="020B0604020202020204" pitchFamily="34" charset="0"/>
               </a:rPr>
-              <a:t>Quest: Hit </a:t>
+              <a:t>Quest: </a:t>
             </a:r>
             <a:r>
               <a:rPr lang="en-US" sz="2400" dirty="0" smtClean="0">
@@ -4383,7 +4363,7 @@
                 <a:latin typeface="Arial" panose="020B0604020202020204" pitchFamily="34" charset="0"/>
                 <a:cs typeface="Arial" panose="020B0604020202020204" pitchFamily="34" charset="0"/>
               </a:rPr>
-              <a:t>heroes with full charged Q.</a:t>
+              <a:t>Hitting enemy heroes with full charged Q gives +0.2 secs duration. (10)</a:t>
             </a:r>
           </a:p>
           <a:p>
@@ -4396,7 +4376,7 @@
                 <a:latin typeface="Arial" panose="020B0604020202020204" pitchFamily="34" charset="0"/>
                 <a:cs typeface="Arial" panose="020B0604020202020204" pitchFamily="34" charset="0"/>
               </a:rPr>
-              <a:t>Reward: 5: 10: +1 sec duration + 15% damage gain over time damage</a:t>
+              <a:t>Reward: +1 second Q fermentation cap</a:t>
             </a:r>
             <a:endParaRPr lang="en-US" sz="2400" dirty="0">
               <a:solidFill>
@@ -4460,7 +4440,7 @@
                 <a:latin typeface="Arial" panose="020B0604020202020204" pitchFamily="34" charset="0"/>
                 <a:cs typeface="Arial" panose="020B0604020202020204" pitchFamily="34" charset="0"/>
               </a:rPr>
-              <a:t>Passive: Trait heals over 3 secs.</a:t>
+              <a:t>Passive: Trait heals over 3 secs but +1%</a:t>
             </a:r>
           </a:p>
           <a:p>
@@ -4483,7 +4463,7 @@
                 <a:latin typeface="Arial" panose="020B0604020202020204" pitchFamily="34" charset="0"/>
                 <a:cs typeface="Arial" panose="020B0604020202020204" pitchFamily="34" charset="0"/>
               </a:rPr>
-              <a:t>: Use </a:t>
+              <a:t>: </a:t>
             </a:r>
             <a:r>
               <a:rPr lang="en-US" sz="2400" dirty="0" smtClean="0">
@@ -4493,7 +4473,7 @@
                 <a:latin typeface="Arial" panose="020B0604020202020204" pitchFamily="34" charset="0"/>
                 <a:cs typeface="Arial" panose="020B0604020202020204" pitchFamily="34" charset="0"/>
               </a:rPr>
-              <a:t>trait.</a:t>
+              <a:t>Using heals +0.1% max hp. (30)</a:t>
             </a:r>
           </a:p>
           <a:p>
@@ -4516,40 +4496,7 @@
                 <a:latin typeface="Arial" panose="020B0604020202020204" pitchFamily="34" charset="0"/>
                 <a:cs typeface="Arial" panose="020B0604020202020204" pitchFamily="34" charset="0"/>
               </a:rPr>
-              <a:t>: </a:t>
-            </a:r>
-            <a:r>
-              <a:rPr lang="en-US" sz="2400" dirty="0" smtClean="0">
-                <a:solidFill>
-                  <a:schemeClr val="tx1"/>
-                </a:solidFill>
-                <a:latin typeface="Arial" panose="020B0604020202020204" pitchFamily="34" charset="0"/>
-                <a:cs typeface="Arial" panose="020B0604020202020204" pitchFamily="34" charset="0"/>
-              </a:rPr>
-              <a:t>Trait heals more</a:t>
-            </a:r>
-          </a:p>
-          <a:p>
-            <a:pPr marL="182880"/>
-            <a:r>
-              <a:rPr lang="en-US" sz="2400" dirty="0">
-                <a:solidFill>
-                  <a:schemeClr val="tx1"/>
-                </a:solidFill>
-                <a:latin typeface="Arial" panose="020B0604020202020204" pitchFamily="34" charset="0"/>
-                <a:cs typeface="Arial" panose="020B0604020202020204" pitchFamily="34" charset="0"/>
-              </a:rPr>
-              <a:t>5</a:t>
-            </a:r>
-            <a:r>
-              <a:rPr lang="en-US" sz="2400" dirty="0" smtClean="0">
-                <a:solidFill>
-                  <a:schemeClr val="tx1"/>
-                </a:solidFill>
-                <a:latin typeface="Arial" panose="020B0604020202020204" pitchFamily="34" charset="0"/>
-                <a:cs typeface="Arial" panose="020B0604020202020204" pitchFamily="34" charset="0"/>
-              </a:rPr>
-              <a:t>: 10: 20: 40: +1% max health</a:t>
+              <a:t>: +10% cooldown speed on basic abilities.</a:t>
             </a:r>
             <a:endParaRPr lang="en-US" sz="2400" dirty="0">
               <a:solidFill>
@@ -5461,7 +5408,27 @@
                 <a:latin typeface="Arial" panose="020B0604020202020204" pitchFamily="34" charset="0"/>
                 <a:cs typeface="Arial" panose="020B0604020202020204" pitchFamily="34" charset="0"/>
               </a:rPr>
-              <a:t>Every skill used after W channel empowers its damage by 2%. It deals true damage if 3 skills are used.</a:t>
+              <a:t>Every skill used after W channel empowers its damage by </a:t>
+            </a:r>
+            <a:r>
+              <a:rPr lang="en-US" sz="2400" dirty="0" smtClean="0">
+                <a:solidFill>
+                  <a:schemeClr val="tx1"/>
+                </a:solidFill>
+                <a:latin typeface="Arial" panose="020B0604020202020204" pitchFamily="34" charset="0"/>
+                <a:cs typeface="Arial" panose="020B0604020202020204" pitchFamily="34" charset="0"/>
+              </a:rPr>
+              <a:t>1% It </a:t>
+            </a:r>
+            <a:r>
+              <a:rPr lang="en-US" sz="2400" dirty="0" smtClean="0">
+                <a:solidFill>
+                  <a:schemeClr val="tx1"/>
+                </a:solidFill>
+                <a:latin typeface="Arial" panose="020B0604020202020204" pitchFamily="34" charset="0"/>
+                <a:cs typeface="Arial" panose="020B0604020202020204" pitchFamily="34" charset="0"/>
+              </a:rPr>
+              <a:t>deals true damage if 3 skills are used.</a:t>
             </a:r>
             <a:endParaRPr lang="en-US" sz="2400" dirty="0">
               <a:solidFill>
@@ -5942,8 +5909,8 @@
         </p:nvSpPr>
         <p:spPr>
           <a:xfrm>
-            <a:off x="7772400" y="1371600"/>
-            <a:ext cx="5943600" cy="1371600"/>
+            <a:off x="7772400" y="2286000"/>
+            <a:ext cx="5943600" cy="914400"/>
           </a:xfrm>
           <a:prstGeom prst="rect">
             <a:avLst/>
@@ -5986,7 +5953,27 @@
                 <a:latin typeface="Arial" panose="020B0604020202020204" pitchFamily="34" charset="0"/>
                 <a:cs typeface="Arial" panose="020B0604020202020204" pitchFamily="34" charset="0"/>
               </a:rPr>
-              <a:t>R1 makes enemy heroes vulnerable increasing all damage taken from Garagast by 50% for 5 seconds.</a:t>
+              <a:t>R1 makes enemy heroes vulnerable </a:t>
+            </a:r>
+            <a:r>
+              <a:rPr lang="en-US" sz="2400" dirty="0" smtClean="0">
+                <a:solidFill>
+                  <a:schemeClr val="tx1"/>
+                </a:solidFill>
+                <a:latin typeface="Arial" panose="020B0604020202020204" pitchFamily="34" charset="0"/>
+                <a:cs typeface="Arial" panose="020B0604020202020204" pitchFamily="34" charset="0"/>
+              </a:rPr>
+              <a:t>for Garagast </a:t>
+            </a:r>
+            <a:r>
+              <a:rPr lang="en-US" sz="2400" dirty="0" smtClean="0">
+                <a:solidFill>
+                  <a:schemeClr val="tx1"/>
+                </a:solidFill>
+                <a:latin typeface="Arial" panose="020B0604020202020204" pitchFamily="34" charset="0"/>
+                <a:cs typeface="Arial" panose="020B0604020202020204" pitchFamily="34" charset="0"/>
+              </a:rPr>
+              <a:t>by 50% for 5 seconds.</a:t>
             </a:r>
             <a:endParaRPr lang="en-US" sz="2400" dirty="0">
               <a:solidFill>
@@ -6007,7 +5994,7 @@
         <p:spPr>
           <a:xfrm>
             <a:off x="7772400" y="5029200"/>
-            <a:ext cx="5943600" cy="1371600"/>
+            <a:ext cx="5943600" cy="914400"/>
           </a:xfrm>
           <a:prstGeom prst="rect">
             <a:avLst/>
@@ -6042,6 +6029,16 @@
           <a:lstStyle/>
           <a:p>
             <a:pPr marL="182880"/>
+            <a:r>
+              <a:rPr lang="en-US" sz="2400" dirty="0" smtClean="0">
+                <a:solidFill>
+                  <a:schemeClr val="tx1"/>
+                </a:solidFill>
+                <a:latin typeface="Arial" panose="020B0604020202020204" pitchFamily="34" charset="0"/>
+                <a:cs typeface="Arial" panose="020B0604020202020204" pitchFamily="34" charset="0"/>
+              </a:rPr>
+              <a:t>W channels for 2 secs and has 3 secs cooldown.</a:t>
+            </a:r>
             <a:endParaRPr lang="en-US" sz="2400" dirty="0">
               <a:solidFill>
                 <a:schemeClr val="tx1"/>
@@ -6060,8 +6057,8 @@
         </p:nvSpPr>
         <p:spPr>
           <a:xfrm>
-            <a:off x="7772400" y="6858000"/>
-            <a:ext cx="5943600" cy="1371600"/>
+            <a:off x="7772400" y="6400800"/>
+            <a:ext cx="5943600" cy="914400"/>
           </a:xfrm>
           <a:prstGeom prst="rect">
             <a:avLst/>
@@ -6104,7 +6101,7 @@
                 <a:latin typeface="Arial" panose="020B0604020202020204" pitchFamily="34" charset="0"/>
                 <a:cs typeface="Arial" panose="020B0604020202020204" pitchFamily="34" charset="0"/>
               </a:rPr>
-              <a:t>Trait cooldown is reduced to 3 secs and trait gives 30% movement speed decaying over 1 sec.</a:t>
+              <a:t>Trait cooldown is reduced to 3 secs and now has 3 stacks.</a:t>
             </a:r>
             <a:endParaRPr lang="en-US" sz="2400" dirty="0">
               <a:solidFill>
@@ -6124,7 +6121,7 @@
         </p:nvSpPr>
         <p:spPr>
           <a:xfrm>
-            <a:off x="7772400" y="0"/>
+            <a:off x="7772400" y="914400"/>
             <a:ext cx="5943600" cy="914400"/>
           </a:xfrm>
           <a:prstGeom prst="rect">
@@ -6217,6 +6214,16 @@
           <a:lstStyle/>
           <a:p>
             <a:pPr marL="182880"/>
+            <a:r>
+              <a:rPr lang="en-US" sz="2400" dirty="0" smtClean="0">
+                <a:solidFill>
+                  <a:schemeClr val="tx1"/>
+                </a:solidFill>
+                <a:latin typeface="Arial" panose="020B0604020202020204" pitchFamily="34" charset="0"/>
+                <a:cs typeface="Arial" panose="020B0604020202020204" pitchFamily="34" charset="0"/>
+              </a:rPr>
+              <a:t>Becomes unstoppable and gains 20% movement speed for 2 secs. 90 secs cd.</a:t>
+            </a:r>
             <a:endParaRPr lang="en-US" sz="2400" dirty="0">
               <a:solidFill>
                 <a:schemeClr val="tx1"/>
@@ -6353,7 +6360,7 @@
                 <a:latin typeface="Arial" panose="020B0604020202020204" pitchFamily="34" charset="0"/>
                 <a:cs typeface="Arial" panose="020B0604020202020204" pitchFamily="34" charset="0"/>
               </a:rPr>
-              <a:t>heroes deal </a:t>
+              <a:t>heroes </a:t>
             </a:r>
             <a:r>
               <a:rPr lang="en-US" sz="2400" dirty="0" smtClean="0">
@@ -6363,7 +6370,7 @@
                 <a:latin typeface="Arial" panose="020B0604020202020204" pitchFamily="34" charset="0"/>
                 <a:cs typeface="Arial" panose="020B0604020202020204" pitchFamily="34" charset="0"/>
               </a:rPr>
-              <a:t>150% damage and </a:t>
+              <a:t>deal double damage </a:t>
             </a:r>
             <a:r>
               <a:rPr lang="en-US" sz="2400" dirty="0" smtClean="0">
@@ -6373,7 +6380,7 @@
                 <a:latin typeface="Arial" panose="020B0604020202020204" pitchFamily="34" charset="0"/>
                 <a:cs typeface="Arial" panose="020B0604020202020204" pitchFamily="34" charset="0"/>
               </a:rPr>
-              <a:t>give 10% movement speed for 2 secs.</a:t>
+              <a:t>and give 10% movement speed for 2 secs.</a:t>
             </a:r>
             <a:endParaRPr lang="en-US" sz="2400" dirty="0">
               <a:solidFill>
@@ -6457,8 +6464,8 @@
         </p:nvSpPr>
         <p:spPr>
           <a:xfrm>
-            <a:off x="7772400" y="3200400"/>
-            <a:ext cx="5943600" cy="1371600"/>
+            <a:off x="7772400" y="3657600"/>
+            <a:ext cx="5943600" cy="914400"/>
           </a:xfrm>
           <a:prstGeom prst="rect">
             <a:avLst/>
@@ -6501,17 +6508,7 @@
                 <a:latin typeface="Arial" panose="020B0604020202020204" pitchFamily="34" charset="0"/>
                 <a:cs typeface="Arial" panose="020B0604020202020204" pitchFamily="34" charset="0"/>
               </a:rPr>
-              <a:t>Landing E to enemy heroes reduces </a:t>
-            </a:r>
-            <a:r>
-              <a:rPr lang="en-US" sz="2400" dirty="0" smtClean="0">
-                <a:solidFill>
-                  <a:schemeClr val="tx1"/>
-                </a:solidFill>
-                <a:latin typeface="Arial" panose="020B0604020202020204" pitchFamily="34" charset="0"/>
-                <a:cs typeface="Arial" panose="020B0604020202020204" pitchFamily="34" charset="0"/>
-              </a:rPr>
-              <a:t>R2’s cooldown by 10 secs.</a:t>
+              <a:t>Landing E to enemy heroes reduces R2’s cooldown by 10 seconds.</a:t>
             </a:r>
             <a:endParaRPr lang="en-US" sz="2400" dirty="0">
               <a:solidFill>
@@ -6564,14 +6561,14 @@
           <a:p>
             <a:pPr algn="ctr"/>
             <a:r>
-              <a:rPr lang="en-US" sz="5400" b="1" dirty="0">
-                <a:solidFill>
-                  <a:schemeClr val="tx1"/>
-                </a:solidFill>
-                <a:latin typeface="Arial" panose="020B0604020202020204" pitchFamily="34" charset="0"/>
-                <a:cs typeface="Arial" panose="020B0604020202020204" pitchFamily="34" charset="0"/>
-              </a:rPr>
-              <a:t>?</a:t>
+              <a:rPr lang="en-US" sz="5400" b="1" dirty="0" smtClean="0">
+                <a:solidFill>
+                  <a:schemeClr val="tx1"/>
+                </a:solidFill>
+                <a:latin typeface="Arial" panose="020B0604020202020204" pitchFamily="34" charset="0"/>
+                <a:cs typeface="Arial" panose="020B0604020202020204" pitchFamily="34" charset="0"/>
+              </a:rPr>
+              <a:t>A</a:t>
             </a:r>
             <a:endParaRPr lang="en-US" sz="5400" b="1" dirty="0">
               <a:solidFill>
@@ -6711,7 +6708,7 @@
         </p:nvSpPr>
         <p:spPr>
           <a:xfrm>
-            <a:off x="6858000" y="914400"/>
+            <a:off x="6858000" y="1828800"/>
             <a:ext cx="1828800" cy="914400"/>
           </a:xfrm>
           <a:prstGeom prst="rect">
@@ -6771,7 +6768,7 @@
         </p:nvSpPr>
         <p:spPr>
           <a:xfrm>
-            <a:off x="6858000" y="2743200"/>
+            <a:off x="6858000" y="3200400"/>
             <a:ext cx="1828800" cy="914400"/>
           </a:xfrm>
           <a:prstGeom prst="rect">
@@ -6871,7 +6868,7 @@
                 <a:latin typeface="Arial" panose="020B0604020202020204" pitchFamily="34" charset="0"/>
                 <a:cs typeface="Arial" panose="020B0604020202020204" pitchFamily="34" charset="0"/>
               </a:rPr>
-              <a:t>?</a:t>
+              <a:t>W</a:t>
             </a:r>
             <a:endParaRPr lang="en-US" sz="5400" b="1" dirty="0">
               <a:solidFill>
@@ -6891,7 +6888,7 @@
         </p:nvSpPr>
         <p:spPr>
           <a:xfrm>
-            <a:off x="7315200" y="6400800"/>
+            <a:off x="7315200" y="5943600"/>
             <a:ext cx="914400" cy="914400"/>
           </a:xfrm>
           <a:prstGeom prst="rect">

</xml_diff>